<commit_message>
Feat: Correções para Jenkins
</commit_message>
<xml_diff>
--- a/apresentacao.pptx
+++ b/apresentacao.pptx
@@ -125,7 +125,7 @@
   <p1510:revLst>
     <p1510:client id="{127EF734-2B53-49CA-935D-785FB2366B33}" v="151" dt="2022-10-17T04:28:02.755"/>
     <p1510:client id="{1890FDBE-31E5-4691-A432-A2FE9162A89A}" v="1188" dt="2022-10-31T14:42:59.542"/>
-    <p1510:client id="{18CA984F-8276-4C6E-8E51-AA127D5BA92A}" v="4815" dt="2022-11-25T00:36:26.602"/>
+    <p1510:client id="{18CA984F-8276-4C6E-8E51-AA127D5BA92A}" v="4825" dt="2022-11-25T00:45:38.395"/>
     <p1510:client id="{1FB1EC75-8BA8-4944-9FA8-83062D504654}" v="603" dt="2022-10-17T16:05:29.172"/>
     <p1510:client id="{33F423F7-CF48-45D0-8202-00AD559CFD29}" v="1020" dt="2022-11-14T16:47:37.610"/>
     <p1510:client id="{449EBB06-5775-4966-9C51-C492F6904EDE}" v="125" dt="2022-10-17T16:13:17.594"/>
@@ -15945,8 +15945,8 @@
         </p:blipFill>
         <p:spPr>
           <a:xfrm flipV="1">
-            <a:off x="8873546" y="2437532"/>
-            <a:ext cx="1663188" cy="750940"/>
+            <a:off x="8988564" y="2437532"/>
+            <a:ext cx="1548170" cy="693432"/>
           </a:xfrm>
           <a:prstGeom prst="rect">
             <a:avLst/>
@@ -16093,8 +16093,8 @@
         </p:nvSpPr>
         <p:spPr>
           <a:xfrm>
-            <a:off x="337871" y="2380333"/>
-            <a:ext cx="4484290" cy="2481791"/>
+            <a:off x="337871" y="2250937"/>
+            <a:ext cx="4570554" cy="2438659"/>
           </a:xfrm>
           <a:solidFill>
             <a:schemeClr val="accent1"/>
@@ -16444,42 +16444,15 @@
                 </a:solidFill>
                 <a:cs typeface="Calibri Light"/>
               </a:rPr>
-              <a:t>!   </a:t>
+              <a:t>!  </a:t>
             </a:r>
-            <a:r>
-              <a:rPr lang="en-US" sz="2000" b="1" dirty="0">
-                <a:solidFill>
-                  <a:schemeClr val="tx1"/>
-                </a:solidFill>
-                <a:cs typeface="Calibri Light"/>
-              </a:rPr>
-              <a:t> </a:t>
-            </a:r>
-            <a:r>
-              <a:rPr lang="en-US" sz="1800" b="1" dirty="0">
-                <a:solidFill>
-                  <a:schemeClr val="tx1"/>
-                </a:solidFill>
-                <a:cs typeface="Calibri Light"/>
-              </a:rPr>
-              <a:t> </a:t>
-            </a:r>
-            <a:r>
-              <a:rPr lang="en-US" sz="1800" b="1" dirty="0">
-                <a:solidFill>
-                  <a:schemeClr val="tx1"/>
-                </a:solidFill>
-                <a:highlight>
-                  <a:srgbClr val="C0C0C0"/>
-                </a:highlight>
-                <a:cs typeface="Calibri Light"/>
-              </a:rPr>
-              <a:t>                      </a:t>
-            </a:r>
-            <a:endParaRPr lang="pt-BR" sz="1800">
+            <a:endParaRPr lang="en-US" sz="1800" b="1" dirty="0">
               <a:solidFill>
                 <a:schemeClr val="tx1"/>
               </a:solidFill>
+              <a:highlight>
+                <a:srgbClr val="C0C0C0"/>
+              </a:highlight>
               <a:cs typeface="Calibri Light" panose="020F0302020204030204"/>
             </a:endParaRPr>
           </a:p>
@@ -16507,8 +16480,8 @@
         </p:blipFill>
         <p:spPr>
           <a:xfrm>
-            <a:off x="-93258" y="5040114"/>
-            <a:ext cx="2673730" cy="1761964"/>
+            <a:off x="-193900" y="4810076"/>
+            <a:ext cx="2875013" cy="1891360"/>
           </a:xfrm>
           <a:prstGeom prst="rect">
             <a:avLst/>

</xml_diff>